<commit_message>
adding example for new yaml header
</commit_message>
<xml_diff>
--- a/06-r4ds/r4ds.pptx
+++ b/06-r4ds/r4ds.pptx
@@ -2,8 +2,11 @@
 <file path=ppt/presentation.xml><?xml version="1.0" encoding="utf-8"?>
 <p:presentation xmlns:a="http://schemas.openxmlformats.org/drawingml/2006/main" xmlns:r="http://schemas.openxmlformats.org/officeDocument/2006/relationships" xmlns:p="http://schemas.openxmlformats.org/presentationml/2006/main" autoCompressPictures="0">
   <p:sldMasterIdLst>
-    <p:sldMasterId id="2147483719" r:id="rId1"/>
+    <p:sldMasterId id="2147483731" r:id="rId1"/>
   </p:sldMasterIdLst>
+  <p:notesMasterIdLst>
+    <p:NotesMasterId r:id="rId15"/>
+  </p:notesMasterIdLst>
   <p:sldIdLst>
     <p:sldId id="256" r:id="rId2"/>
     <p:sldId id="257" r:id="rId3"/>
@@ -19,7 +22,7 @@
     <p:sldId id="267" r:id="rId13"/>
     <p:sldId id="268" r:id="rId14"/>
   </p:sldIdLst>
-  <p:sldSz cx="9144000" cy="6858000" type="screen4x3"/>
+  <p:sldSz cx="12192000" cy="6858000"/>
   <p:notesSz cx="6858000" cy="9144000"/>
   <p:defaultTextStyle>
     <a:defPPr>
@@ -124,6 +127,498 @@
 </p:presentation>
 </file>
 
+<file path=ppt/notesMasters/notesMaster1.xml><?xml version="1.0" encoding="utf-8"?>
+<p:notesMaster xmlns:a="http://schemas.openxmlformats.org/drawingml/2006/main" xmlns:r="http://schemas.openxmlformats.org/officeDocument/2006/relationships" xmlns:p="http://schemas.openxmlformats.org/presentationml/2006/main">
+  <p:cSld>
+    <p:bg>
+      <p:bgRef idx="1001">
+        <a:schemeClr val="bg1"/>
+      </p:bgRef>
+    </p:bg>
+    <p:spTree>
+      <p:nvGrpSpPr>
+        <p:cNvPr id="1" name=""/>
+        <p:cNvGrpSpPr/>
+        <p:nvPr/>
+      </p:nvGrpSpPr>
+      <p:grpSpPr>
+        <a:xfrm>
+          <a:off x="0" y="0"/>
+          <a:ext cx="0" cy="0"/>
+          <a:chOff x="0" y="0"/>
+          <a:chExt cx="0" cy="0"/>
+        </a:xfrm>
+      </p:grpSpPr>
+      <p:sp>
+        <p:nvSpPr>
+          <p:cNvPr id="2" name="Header Placeholder 1"/>
+          <p:cNvSpPr>
+            <a:spLocks noGrp="1"/>
+          </p:cNvSpPr>
+          <p:nvPr>
+            <p:ph type="hdr" sz="quarter"/>
+          </p:nvPr>
+        </p:nvSpPr>
+        <p:spPr>
+          <a:xfrm>
+            <a:off x="0" y="0"/>
+            <a:ext cx="2971800" cy="458788"/>
+          </a:xfrm>
+          <a:prstGeom prst="rect">
+            <a:avLst/>
+          </a:prstGeom>
+        </p:spPr>
+        <p:txBody>
+          <a:bodyPr vert="horz" lIns="91440" tIns="45720" rIns="91440" bIns="45720" rtlCol="0"/>
+          <a:lstStyle>
+            <a:lvl1pPr algn="l">
+              <a:defRPr sz="1200"/>
+            </a:lvl1pPr>
+          </a:lstStyle>
+          <a:p>
+            <a:endParaRPr lang="en-US"/>
+          </a:p>
+        </p:txBody>
+      </p:sp>
+      <p:sp>
+        <p:nvSpPr>
+          <p:cNvPr id="3" name="Date Placeholder 2"/>
+          <p:cNvSpPr>
+            <a:spLocks noGrp="1"/>
+          </p:cNvSpPr>
+          <p:nvPr>
+            <p:ph type="dt" idx="1"/>
+          </p:nvPr>
+        </p:nvSpPr>
+        <p:spPr>
+          <a:xfrm>
+            <a:off x="3884613" y="0"/>
+            <a:ext cx="2971800" cy="458788"/>
+          </a:xfrm>
+          <a:prstGeom prst="rect">
+            <a:avLst/>
+          </a:prstGeom>
+        </p:spPr>
+        <p:txBody>
+          <a:bodyPr vert="horz" lIns="91440" tIns="45720" rIns="91440" bIns="45720" rtlCol="0"/>
+          <a:lstStyle>
+            <a:lvl1pPr algn="r">
+              <a:defRPr sz="1200"/>
+            </a:lvl1pPr>
+          </a:lstStyle>
+          <a:p>
+            <a:fld id="{0F9C1CCF-B725-44A7-AA57-5E433BD85C9F}" type="datetimeFigureOut">
+              <a:rPr lang="en-US" smtClean="0"/>
+              <a:t>2/17/2018</a:t>
+            </a:fld>
+            <a:endParaRPr lang="en-US"/>
+          </a:p>
+        </p:txBody>
+      </p:sp>
+      <p:sp>
+        <p:nvSpPr>
+          <p:cNvPr id="4" name="Slide Image Placeholder 3"/>
+          <p:cNvSpPr>
+            <a:spLocks noGrp="1" noRot="1" noChangeAspect="1"/>
+          </p:cNvSpPr>
+          <p:nvPr>
+            <p:ph type="sldImg" idx="2"/>
+          </p:nvPr>
+        </p:nvSpPr>
+        <p:spPr>
+          <a:xfrm>
+            <a:off x="1371600" y="1143000"/>
+            <a:ext cx="4114800" cy="3086100"/>
+          </a:xfrm>
+          <a:prstGeom prst="rect">
+            <a:avLst/>
+          </a:prstGeom>
+          <a:noFill/>
+          <a:ln w="12700">
+            <a:solidFill>
+              <a:prstClr val="black"/>
+            </a:solidFill>
+          </a:ln>
+        </p:spPr>
+        <p:txBody>
+          <a:bodyPr vert="horz" lIns="91440" tIns="45720" rIns="91440" bIns="45720" rtlCol="0" anchor="ctr"/>
+          <a:lstStyle/>
+          <a:p>
+            <a:endParaRPr lang="en-US"/>
+          </a:p>
+        </p:txBody>
+      </p:sp>
+      <p:sp>
+        <p:nvSpPr>
+          <p:cNvPr id="5" name="Notes Placeholder 4"/>
+          <p:cNvSpPr>
+            <a:spLocks noGrp="1"/>
+          </p:cNvSpPr>
+          <p:nvPr>
+            <p:ph type="body" sz="quarter" idx="3"/>
+          </p:nvPr>
+        </p:nvSpPr>
+        <p:spPr>
+          <a:xfrm>
+            <a:off x="685800" y="4400550"/>
+            <a:ext cx="5486400" cy="3600450"/>
+          </a:xfrm>
+          <a:prstGeom prst="rect">
+            <a:avLst/>
+          </a:prstGeom>
+        </p:spPr>
+        <p:txBody>
+          <a:bodyPr vert="horz" lIns="91440" tIns="45720" rIns="91440" bIns="45720" rtlCol="0"/>
+          <a:lstStyle/>
+          <a:p>
+            <a:pPr lvl="0"/>
+            <a:r>
+              <a:rPr lang="en-US" smtClean="0"/>
+              <a:t>Click to edit Master text styles</a:t>
+            </a:r>
+          </a:p>
+          <a:p>
+            <a:pPr lvl="1"/>
+            <a:r>
+              <a:rPr lang="en-US" smtClean="0"/>
+              <a:t>Second level</a:t>
+            </a:r>
+          </a:p>
+          <a:p>
+            <a:pPr lvl="2"/>
+            <a:r>
+              <a:rPr lang="en-US" smtClean="0"/>
+              <a:t>Third level</a:t>
+            </a:r>
+          </a:p>
+          <a:p>
+            <a:pPr lvl="3"/>
+            <a:r>
+              <a:rPr lang="en-US" smtClean="0"/>
+              <a:t>Fourth level</a:t>
+            </a:r>
+          </a:p>
+          <a:p>
+            <a:pPr lvl="4"/>
+            <a:r>
+              <a:rPr lang="en-US" smtClean="0"/>
+              <a:t>Fifth level</a:t>
+            </a:r>
+            <a:endParaRPr lang="en-US"/>
+          </a:p>
+        </p:txBody>
+      </p:sp>
+      <p:sp>
+        <p:nvSpPr>
+          <p:cNvPr id="6" name="Footer Placeholder 5"/>
+          <p:cNvSpPr>
+            <a:spLocks noGrp="1"/>
+          </p:cNvSpPr>
+          <p:nvPr>
+            <p:ph type="ftr" sz="quarter" idx="4"/>
+          </p:nvPr>
+        </p:nvSpPr>
+        <p:spPr>
+          <a:xfrm>
+            <a:off x="0" y="8685213"/>
+            <a:ext cx="2971800" cy="458787"/>
+          </a:xfrm>
+          <a:prstGeom prst="rect">
+            <a:avLst/>
+          </a:prstGeom>
+        </p:spPr>
+        <p:txBody>
+          <a:bodyPr vert="horz" lIns="91440" tIns="45720" rIns="91440" bIns="45720" rtlCol="0" anchor="b"/>
+          <a:lstStyle>
+            <a:lvl1pPr algn="l">
+              <a:defRPr sz="1200"/>
+            </a:lvl1pPr>
+          </a:lstStyle>
+          <a:p>
+            <a:endParaRPr lang="en-US"/>
+          </a:p>
+        </p:txBody>
+      </p:sp>
+      <p:sp>
+        <p:nvSpPr>
+          <p:cNvPr id="7" name="Slide Number Placeholder 6"/>
+          <p:cNvSpPr>
+            <a:spLocks noGrp="1"/>
+          </p:cNvSpPr>
+          <p:nvPr>
+            <p:ph type="sldNum" sz="quarter" idx="5"/>
+          </p:nvPr>
+        </p:nvSpPr>
+        <p:spPr>
+          <a:xfrm>
+            <a:off x="3884613" y="8685213"/>
+            <a:ext cx="2971800" cy="458787"/>
+          </a:xfrm>
+          <a:prstGeom prst="rect">
+            <a:avLst/>
+          </a:prstGeom>
+        </p:spPr>
+        <p:txBody>
+          <a:bodyPr vert="horz" lIns="91440" tIns="45720" rIns="91440" bIns="45720" rtlCol="0" anchor="b"/>
+          <a:lstStyle>
+            <a:lvl1pPr algn="r">
+              <a:defRPr sz="1200"/>
+            </a:lvl1pPr>
+          </a:lstStyle>
+          <a:p>
+            <a:fld id="{18BDFEC3-8487-43E8-A154-7C12CBC1FFF2}" type="slidenum">
+              <a:rPr lang="en-US" smtClean="0"/>
+              <a:t>‹#›</a:t>
+            </a:fld>
+            <a:endParaRPr lang="en-US"/>
+          </a:p>
+        </p:txBody>
+      </p:sp>
+    </p:spTree>
+    <p:extLst>
+      <p:ext uri="{BB962C8B-B14F-4D97-AF65-F5344CB8AC3E}">
+        <p14:creationId xmlns:p14="http://schemas.microsoft.com/office/powerpoint/2010/main" val="3782709779"/>
+      </p:ext>
+    </p:extLst>
+  </p:cSld>
+  <p:clrMap bg1="lt1" tx1="dk1" bg2="lt2" tx2="dk2" accent1="accent1" accent2="accent2" accent3="accent3" accent4="accent4" accent5="accent5" accent6="accent6" hlink="hlink" folHlink="folHlink"/>
+  <p:notesStyle>
+    <a:lvl1pPr marL="0" algn="l" defTabSz="914400" rtl="0" eaLnBrk="1" latinLnBrk="0" hangingPunct="1">
+      <a:defRPr sz="1200" kern="1200">
+        <a:solidFill>
+          <a:schemeClr val="tx1"/>
+        </a:solidFill>
+        <a:latin typeface="+mn-lt"/>
+        <a:ea typeface="+mn-ea"/>
+        <a:cs typeface="+mn-cs"/>
+      </a:defRPr>
+    </a:lvl1pPr>
+    <a:lvl2pPr marL="457200" algn="l" defTabSz="914400" rtl="0" eaLnBrk="1" latinLnBrk="0" hangingPunct="1">
+      <a:defRPr sz="1200" kern="1200">
+        <a:solidFill>
+          <a:schemeClr val="tx1"/>
+        </a:solidFill>
+        <a:latin typeface="+mn-lt"/>
+        <a:ea typeface="+mn-ea"/>
+        <a:cs typeface="+mn-cs"/>
+      </a:defRPr>
+    </a:lvl2pPr>
+    <a:lvl3pPr marL="914400" algn="l" defTabSz="914400" rtl="0" eaLnBrk="1" latinLnBrk="0" hangingPunct="1">
+      <a:defRPr sz="1200" kern="1200">
+        <a:solidFill>
+          <a:schemeClr val="tx1"/>
+        </a:solidFill>
+        <a:latin typeface="+mn-lt"/>
+        <a:ea typeface="+mn-ea"/>
+        <a:cs typeface="+mn-cs"/>
+      </a:defRPr>
+    </a:lvl3pPr>
+    <a:lvl4pPr marL="1371600" algn="l" defTabSz="914400" rtl="0" eaLnBrk="1" latinLnBrk="0" hangingPunct="1">
+      <a:defRPr sz="1200" kern="1200">
+        <a:solidFill>
+          <a:schemeClr val="tx1"/>
+        </a:solidFill>
+        <a:latin typeface="+mn-lt"/>
+        <a:ea typeface="+mn-ea"/>
+        <a:cs typeface="+mn-cs"/>
+      </a:defRPr>
+    </a:lvl4pPr>
+    <a:lvl5pPr marL="1828800" algn="l" defTabSz="914400" rtl="0" eaLnBrk="1" latinLnBrk="0" hangingPunct="1">
+      <a:defRPr sz="1200" kern="1200">
+        <a:solidFill>
+          <a:schemeClr val="tx1"/>
+        </a:solidFill>
+        <a:latin typeface="+mn-lt"/>
+        <a:ea typeface="+mn-ea"/>
+        <a:cs typeface="+mn-cs"/>
+      </a:defRPr>
+    </a:lvl5pPr>
+    <a:lvl6pPr marL="2286000" algn="l" defTabSz="914400" rtl="0" eaLnBrk="1" latinLnBrk="0" hangingPunct="1">
+      <a:defRPr sz="1200" kern="1200">
+        <a:solidFill>
+          <a:schemeClr val="tx1"/>
+        </a:solidFill>
+        <a:latin typeface="+mn-lt"/>
+        <a:ea typeface="+mn-ea"/>
+        <a:cs typeface="+mn-cs"/>
+      </a:defRPr>
+    </a:lvl6pPr>
+    <a:lvl7pPr marL="2743200" algn="l" defTabSz="914400" rtl="0" eaLnBrk="1" latinLnBrk="0" hangingPunct="1">
+      <a:defRPr sz="1200" kern="1200">
+        <a:solidFill>
+          <a:schemeClr val="tx1"/>
+        </a:solidFill>
+        <a:latin typeface="+mn-lt"/>
+        <a:ea typeface="+mn-ea"/>
+        <a:cs typeface="+mn-cs"/>
+      </a:defRPr>
+    </a:lvl7pPr>
+    <a:lvl8pPr marL="3200400" algn="l" defTabSz="914400" rtl="0" eaLnBrk="1" latinLnBrk="0" hangingPunct="1">
+      <a:defRPr sz="1200" kern="1200">
+        <a:solidFill>
+          <a:schemeClr val="tx1"/>
+        </a:solidFill>
+        <a:latin typeface="+mn-lt"/>
+        <a:ea typeface="+mn-ea"/>
+        <a:cs typeface="+mn-cs"/>
+      </a:defRPr>
+    </a:lvl8pPr>
+    <a:lvl9pPr marL="3657600" algn="l" defTabSz="914400" rtl="0" eaLnBrk="1" latinLnBrk="0" hangingPunct="1">
+      <a:defRPr sz="1200" kern="1200">
+        <a:solidFill>
+          <a:schemeClr val="tx1"/>
+        </a:solidFill>
+        <a:latin typeface="+mn-lt"/>
+        <a:ea typeface="+mn-ea"/>
+        <a:cs typeface="+mn-cs"/>
+      </a:defRPr>
+    </a:lvl9pPr>
+  </p:notesStyle>
+</p:notesMaster>
+</file>
+
+<file path=ppt/notesSlides/notesSlide1.xml><?xml version="1.0" encoding="utf-8"?>
+<p:notes xmlns:a="http://schemas.openxmlformats.org/drawingml/2006/main" xmlns:r="http://schemas.openxmlformats.org/officeDocument/2006/relationships" xmlns:p="http://schemas.openxmlformats.org/presentationml/2006/main">
+  <p:cSld>
+    <p:spTree>
+      <p:nvGrpSpPr>
+        <p:cNvPr id="1" name=""/>
+        <p:cNvGrpSpPr/>
+        <p:nvPr/>
+      </p:nvGrpSpPr>
+      <p:grpSpPr>
+        <a:xfrm>
+          <a:off x="0" y="0"/>
+          <a:ext cx="0" cy="0"/>
+          <a:chOff x="0" y="0"/>
+          <a:chExt cx="0" cy="0"/>
+        </a:xfrm>
+      </p:grpSpPr>
+      <p:sp>
+        <p:nvSpPr>
+          <p:cNvPr id="2" name="Slide Image Placeholder 1"/>
+          <p:cNvSpPr>
+            <a:spLocks noGrp="1" noRot="1" noChangeAspect="1"/>
+          </p:cNvSpPr>
+          <p:nvPr>
+            <p:ph type="sldImg"/>
+          </p:nvPr>
+        </p:nvSpPr>
+        <p:spPr/>
+      </p:sp>
+      <p:sp>
+        <p:nvSpPr>
+          <p:cNvPr id="3" name="Notes Placeholder 2"/>
+          <p:cNvSpPr>
+            <a:spLocks noGrp="1"/>
+          </p:cNvSpPr>
+          <p:nvPr>
+            <p:ph type="body" idx="1"/>
+          </p:nvPr>
+        </p:nvSpPr>
+        <p:spPr/>
+        <p:txBody>
+          <a:bodyPr/>
+          <a:lstStyle/>
+          <a:p>
+            <a:pPr lvl="0" marL="0" indent="0">
+              <a:buNone/>
+            </a:pPr>
+            <a:r>
+              <a:rPr/>
+              <a:t>here</a:t>
+            </a:r>
+            <a:r>
+              <a:rPr/>
+              <a:t> </a:t>
+            </a:r>
+            <a:r>
+              <a:rPr/>
+              <a:t>are</a:t>
+            </a:r>
+            <a:r>
+              <a:rPr/>
+              <a:t> </a:t>
+            </a:r>
+            <a:r>
+              <a:rPr/>
+              <a:t>my</a:t>
+            </a:r>
+            <a:r>
+              <a:rPr/>
+              <a:t> </a:t>
+            </a:r>
+            <a:r>
+              <a:rPr/>
+              <a:t>notes</a:t>
+            </a:r>
+          </a:p>
+          <a:p>
+            <a:pPr lvl="0" marL="0" indent="0">
+              <a:buNone/>
+            </a:pPr>
+          </a:p>
+          <a:p>
+            <a:pPr lvl="1"/>
+            <a:r>
+              <a:rPr/>
+              <a:t>a</a:t>
+            </a:r>
+          </a:p>
+          <a:p>
+            <a:pPr lvl="0" marL="0" indent="0">
+              <a:buNone/>
+            </a:pPr>
+          </a:p>
+          <a:p>
+            <a:pPr lvl="1"/>
+            <a:r>
+              <a:rPr/>
+              <a:t>b</a:t>
+            </a:r>
+          </a:p>
+          <a:p>
+            <a:pPr lvl="0" marL="0" indent="0">
+              <a:buNone/>
+            </a:pPr>
+          </a:p>
+          <a:p>
+            <a:pPr lvl="1"/>
+            <a:r>
+              <a:rPr/>
+              <a:t>c</a:t>
+            </a:r>
+          </a:p>
+        </p:txBody>
+      </p:sp>
+      <p:sp>
+        <p:nvSpPr>
+          <p:cNvPr id="4" name="Slide Number Placeholder 3"/>
+          <p:cNvSpPr>
+            <a:spLocks noGrp="1"/>
+          </p:cNvSpPr>
+          <p:nvPr>
+            <p:ph type="sldNum" sz="quarter" idx="10"/>
+          </p:nvPr>
+        </p:nvSpPr>
+        <p:spPr/>
+        <p:txBody>
+          <a:bodyPr/>
+          <a:lstStyle/>
+          <a:p>
+            <a:fld id="{18BDFEC3-8487-43E8-A154-7C12CBC1FFF2}" type="slidenum">
+              <a:rPr lang="en-US"/>
+              <a:t>5</a:t>
+            </a:fld>
+            <a:endParaRPr lang="en-US"/>
+          </a:p>
+        </p:txBody>
+      </p:sp>
+    </p:spTree>
+  </p:cSld>
+</p:notes>
+</file>
+
 <file path=ppt/slideLayouts/slideLayout1.xml><?xml version="1.0" encoding="utf-8"?>
 <p:sldLayout xmlns:a="http://schemas.openxmlformats.org/drawingml/2006/main" xmlns:r="http://schemas.openxmlformats.org/officeDocument/2006/relationships" xmlns:p="http://schemas.openxmlformats.org/presentationml/2006/main" type="title" preserve="1">
   <p:cSld name="Title Slide">
@@ -153,8 +648,8 @@
         </p:nvSpPr>
         <p:spPr>
           <a:xfrm>
-            <a:off x="685800" y="1122363"/>
-            <a:ext cx="7772400" cy="2387600"/>
+            <a:off x="1524000" y="1122363"/>
+            <a:ext cx="9144000" cy="2387600"/>
           </a:xfrm>
         </p:spPr>
         <p:txBody>
@@ -185,8 +680,8 @@
         </p:nvSpPr>
         <p:spPr>
           <a:xfrm>
-            <a:off x="1143000" y="3602038"/>
-            <a:ext cx="6858000" cy="1655762"/>
+            <a:off x="1524000" y="3602038"/>
+            <a:ext cx="9144000" cy="1655762"/>
           </a:xfrm>
         </p:spPr>
         <p:txBody>
@@ -255,7 +750,7 @@
           <a:p>
             <a:fld id="{4AAD347D-5ACD-4C99-B74B-A9C85AD731AF}" type="datetimeFigureOut">
               <a:rPr lang="en-US" smtClean="0"/>
-              <a:t>3/18/18</a:t>
+              <a:t>3/19/18</a:t>
             </a:fld>
             <a:endParaRPr lang="en-US" dirty="0"/>
           </a:p>
@@ -306,7 +801,7 @@
     </p:spTree>
     <p:extLst>
       <p:ext uri="{BB962C8B-B14F-4D97-AF65-F5344CB8AC3E}">
-        <p14:creationId xmlns:p14="http://schemas.microsoft.com/office/powerpoint/2010/main" val="3534772705"/>
+        <p14:creationId xmlns:p14="http://schemas.microsoft.com/office/powerpoint/2010/main" val="2477200523"/>
       </p:ext>
     </p:extLst>
   </p:cSld>
@@ -425,7 +920,7 @@
           <a:p>
             <a:fld id="{4509A250-FF31-4206-8172-F9D3106AACB1}" type="datetimeFigureOut">
               <a:rPr lang="en-US" smtClean="0"/>
-              <a:t>3/18/18</a:t>
+              <a:t>3/19/18</a:t>
             </a:fld>
             <a:endParaRPr lang="en-US" dirty="0"/>
           </a:p>
@@ -476,7 +971,7 @@
     </p:spTree>
     <p:extLst>
       <p:ext uri="{BB962C8B-B14F-4D97-AF65-F5344CB8AC3E}">
-        <p14:creationId xmlns:p14="http://schemas.microsoft.com/office/powerpoint/2010/main" val="2636466668"/>
+        <p14:creationId xmlns:p14="http://schemas.microsoft.com/office/powerpoint/2010/main" val="2244434704"/>
       </p:ext>
     </p:extLst>
   </p:cSld>
@@ -515,8 +1010,8 @@
         </p:nvSpPr>
         <p:spPr>
           <a:xfrm>
-            <a:off x="6543676" y="365125"/>
-            <a:ext cx="1971675" cy="5811838"/>
+            <a:off x="8724900" y="365125"/>
+            <a:ext cx="2628900" cy="5811838"/>
           </a:xfrm>
         </p:spPr>
         <p:txBody>
@@ -543,8 +1038,8 @@
         </p:nvSpPr>
         <p:spPr>
           <a:xfrm>
-            <a:off x="628651" y="365125"/>
-            <a:ext cx="5800725" cy="5811838"/>
+            <a:off x="838200" y="365125"/>
+            <a:ext cx="7734300" cy="5811838"/>
           </a:xfrm>
         </p:spPr>
         <p:txBody>
@@ -605,7 +1100,7 @@
           <a:p>
             <a:fld id="{4509A250-FF31-4206-8172-F9D3106AACB1}" type="datetimeFigureOut">
               <a:rPr lang="en-US" smtClean="0"/>
-              <a:t>3/18/18</a:t>
+              <a:t>3/19/18</a:t>
             </a:fld>
             <a:endParaRPr lang="en-US" dirty="0"/>
           </a:p>
@@ -656,7 +1151,7 @@
     </p:spTree>
     <p:extLst>
       <p:ext uri="{BB962C8B-B14F-4D97-AF65-F5344CB8AC3E}">
-        <p14:creationId xmlns:p14="http://schemas.microsoft.com/office/powerpoint/2010/main" val="1732888861"/>
+        <p14:creationId xmlns:p14="http://schemas.microsoft.com/office/powerpoint/2010/main" val="3543279308"/>
       </p:ext>
     </p:extLst>
   </p:cSld>
@@ -775,7 +1270,7 @@
           <a:p>
             <a:fld id="{4509A250-FF31-4206-8172-F9D3106AACB1}" type="datetimeFigureOut">
               <a:rPr lang="en-US" smtClean="0"/>
-              <a:t>3/18/18</a:t>
+              <a:t>3/19/18</a:t>
             </a:fld>
             <a:endParaRPr lang="en-US" dirty="0"/>
           </a:p>
@@ -826,7 +1321,7 @@
     </p:spTree>
     <p:extLst>
       <p:ext uri="{BB962C8B-B14F-4D97-AF65-F5344CB8AC3E}">
-        <p14:creationId xmlns:p14="http://schemas.microsoft.com/office/powerpoint/2010/main" val="1995044099"/>
+        <p14:creationId xmlns:p14="http://schemas.microsoft.com/office/powerpoint/2010/main" val="3854567242"/>
       </p:ext>
     </p:extLst>
   </p:cSld>
@@ -865,8 +1360,8 @@
         </p:nvSpPr>
         <p:spPr>
           <a:xfrm>
-            <a:off x="623888" y="1709741"/>
-            <a:ext cx="7886700" cy="2852737"/>
+            <a:off x="831850" y="1709738"/>
+            <a:ext cx="10515600" cy="2852737"/>
           </a:xfrm>
         </p:spPr>
         <p:txBody>
@@ -897,8 +1392,8 @@
         </p:nvSpPr>
         <p:spPr>
           <a:xfrm>
-            <a:off x="623888" y="4589466"/>
-            <a:ext cx="7886700" cy="1500187"/>
+            <a:off x="831850" y="4589463"/>
+            <a:ext cx="10515600" cy="1500187"/>
           </a:xfrm>
         </p:spPr>
         <p:txBody>
@@ -908,7 +1403,9 @@
               <a:buNone/>
               <a:defRPr sz="2400">
                 <a:solidFill>
-                  <a:schemeClr val="tx1"/>
+                  <a:schemeClr val="tx1">
+                    <a:tint val="75000"/>
+                  </a:schemeClr>
                 </a:solidFill>
               </a:defRPr>
             </a:lvl1pPr>
@@ -1019,7 +1516,7 @@
           <a:p>
             <a:fld id="{9796027F-7875-4030-9381-8BD8C4F21935}" type="datetimeFigureOut">
               <a:rPr lang="en-US" smtClean="0"/>
-              <a:t>3/18/18</a:t>
+              <a:t>3/19/18</a:t>
             </a:fld>
             <a:endParaRPr lang="en-US" dirty="0"/>
           </a:p>
@@ -1070,7 +1567,7 @@
     </p:spTree>
     <p:extLst>
       <p:ext uri="{BB962C8B-B14F-4D97-AF65-F5344CB8AC3E}">
-        <p14:creationId xmlns:p14="http://schemas.microsoft.com/office/powerpoint/2010/main" val="2240296565"/>
+        <p14:creationId xmlns:p14="http://schemas.microsoft.com/office/powerpoint/2010/main" val="1497792428"/>
       </p:ext>
     </p:extLst>
   </p:cSld>
@@ -1132,8 +1629,8 @@
         </p:nvSpPr>
         <p:spPr>
           <a:xfrm>
-            <a:off x="628650" y="1825625"/>
-            <a:ext cx="3886200" cy="4351338"/>
+            <a:off x="838200" y="1825625"/>
+            <a:ext cx="5181600" cy="4351338"/>
           </a:xfrm>
         </p:spPr>
         <p:txBody>
@@ -1189,8 +1686,8 @@
         </p:nvSpPr>
         <p:spPr>
           <a:xfrm>
-            <a:off x="4629150" y="1825625"/>
-            <a:ext cx="3886200" cy="4351338"/>
+            <a:off x="6172200" y="1825625"/>
+            <a:ext cx="5181600" cy="4351338"/>
           </a:xfrm>
         </p:spPr>
         <p:txBody>
@@ -1251,7 +1748,7 @@
           <a:p>
             <a:fld id="{9796027F-7875-4030-9381-8BD8C4F21935}" type="datetimeFigureOut">
               <a:rPr lang="en-US" smtClean="0"/>
-              <a:t>3/18/18</a:t>
+              <a:t>3/19/18</a:t>
             </a:fld>
             <a:endParaRPr lang="en-US" dirty="0"/>
           </a:p>
@@ -1302,7 +1799,7 @@
     </p:spTree>
     <p:extLst>
       <p:ext uri="{BB962C8B-B14F-4D97-AF65-F5344CB8AC3E}">
-        <p14:creationId xmlns:p14="http://schemas.microsoft.com/office/powerpoint/2010/main" val="287173876"/>
+        <p14:creationId xmlns:p14="http://schemas.microsoft.com/office/powerpoint/2010/main" val="2623079149"/>
       </p:ext>
     </p:extLst>
   </p:cSld>
@@ -1341,8 +1838,8 @@
         </p:nvSpPr>
         <p:spPr>
           <a:xfrm>
-            <a:off x="629841" y="365128"/>
-            <a:ext cx="7886700" cy="1325563"/>
+            <a:off x="839788" y="365125"/>
+            <a:ext cx="10515600" cy="1325563"/>
           </a:xfrm>
         </p:spPr>
         <p:txBody>
@@ -1369,8 +1866,8 @@
         </p:nvSpPr>
         <p:spPr>
           <a:xfrm>
-            <a:off x="629842" y="1681163"/>
-            <a:ext cx="3868340" cy="823912"/>
+            <a:off x="839788" y="1681163"/>
+            <a:ext cx="5157787" cy="823912"/>
           </a:xfrm>
         </p:spPr>
         <p:txBody>
@@ -1434,8 +1931,8 @@
         </p:nvSpPr>
         <p:spPr>
           <a:xfrm>
-            <a:off x="629842" y="2505075"/>
-            <a:ext cx="3868340" cy="3684588"/>
+            <a:off x="839788" y="2505075"/>
+            <a:ext cx="5157787" cy="3684588"/>
           </a:xfrm>
         </p:spPr>
         <p:txBody>
@@ -1491,8 +1988,8 @@
         </p:nvSpPr>
         <p:spPr>
           <a:xfrm>
-            <a:off x="4629151" y="1681163"/>
-            <a:ext cx="3887391" cy="823912"/>
+            <a:off x="6172200" y="1681163"/>
+            <a:ext cx="5183188" cy="823912"/>
           </a:xfrm>
         </p:spPr>
         <p:txBody>
@@ -1556,8 +2053,8 @@
         </p:nvSpPr>
         <p:spPr>
           <a:xfrm>
-            <a:off x="4629151" y="2505075"/>
-            <a:ext cx="3887391" cy="3684588"/>
+            <a:off x="6172200" y="2505075"/>
+            <a:ext cx="5183188" cy="3684588"/>
           </a:xfrm>
         </p:spPr>
         <p:txBody>
@@ -1618,7 +2115,7 @@
           <a:p>
             <a:fld id="{9796027F-7875-4030-9381-8BD8C4F21935}" type="datetimeFigureOut">
               <a:rPr lang="en-US" smtClean="0"/>
-              <a:t>3/18/18</a:t>
+              <a:t>3/19/18</a:t>
             </a:fld>
             <a:endParaRPr lang="en-US" dirty="0"/>
           </a:p>
@@ -1669,7 +2166,7 @@
     </p:spTree>
     <p:extLst>
       <p:ext uri="{BB962C8B-B14F-4D97-AF65-F5344CB8AC3E}">
-        <p14:creationId xmlns:p14="http://schemas.microsoft.com/office/powerpoint/2010/main" val="3053760757"/>
+        <p14:creationId xmlns:p14="http://schemas.microsoft.com/office/powerpoint/2010/main" val="927135156"/>
       </p:ext>
     </p:extLst>
   </p:cSld>
@@ -1736,7 +2233,7 @@
           <a:p>
             <a:fld id="{4509A250-FF31-4206-8172-F9D3106AACB1}" type="datetimeFigureOut">
               <a:rPr lang="en-US" smtClean="0"/>
-              <a:t>3/18/18</a:t>
+              <a:t>3/19/18</a:t>
             </a:fld>
             <a:endParaRPr lang="en-US" dirty="0"/>
           </a:p>
@@ -1787,7 +2284,7 @@
     </p:spTree>
     <p:extLst>
       <p:ext uri="{BB962C8B-B14F-4D97-AF65-F5344CB8AC3E}">
-        <p14:creationId xmlns:p14="http://schemas.microsoft.com/office/powerpoint/2010/main" val="4061264142"/>
+        <p14:creationId xmlns:p14="http://schemas.microsoft.com/office/powerpoint/2010/main" val="3264931755"/>
       </p:ext>
     </p:extLst>
   </p:cSld>
@@ -1831,7 +2328,7 @@
           <a:p>
             <a:fld id="{4509A250-FF31-4206-8172-F9D3106AACB1}" type="datetimeFigureOut">
               <a:rPr lang="en-US" smtClean="0"/>
-              <a:t>3/18/18</a:t>
+              <a:t>3/19/18</a:t>
             </a:fld>
             <a:endParaRPr lang="en-US" dirty="0"/>
           </a:p>
@@ -1882,7 +2379,7 @@
     </p:spTree>
     <p:extLst>
       <p:ext uri="{BB962C8B-B14F-4D97-AF65-F5344CB8AC3E}">
-        <p14:creationId xmlns:p14="http://schemas.microsoft.com/office/powerpoint/2010/main" val="2392792352"/>
+        <p14:creationId xmlns:p14="http://schemas.microsoft.com/office/powerpoint/2010/main" val="1377805326"/>
       </p:ext>
     </p:extLst>
   </p:cSld>
@@ -1921,8 +2418,8 @@
         </p:nvSpPr>
         <p:spPr>
           <a:xfrm>
-            <a:off x="629841" y="457200"/>
-            <a:ext cx="2949178" cy="1600200"/>
+            <a:off x="839788" y="457200"/>
+            <a:ext cx="3932237" cy="1600200"/>
           </a:xfrm>
         </p:spPr>
         <p:txBody>
@@ -1953,8 +2450,8 @@
         </p:nvSpPr>
         <p:spPr>
           <a:xfrm>
-            <a:off x="3887391" y="987428"/>
-            <a:ext cx="4629150" cy="4873625"/>
+            <a:off x="5183188" y="987425"/>
+            <a:ext cx="6172200" cy="4873625"/>
           </a:xfrm>
         </p:spPr>
         <p:txBody>
@@ -2038,8 +2535,8 @@
         </p:nvSpPr>
         <p:spPr>
           <a:xfrm>
-            <a:off x="629841" y="2057400"/>
-            <a:ext cx="2949178" cy="3811588"/>
+            <a:off x="839788" y="2057400"/>
+            <a:ext cx="3932237" cy="3811588"/>
           </a:xfrm>
         </p:spPr>
         <p:txBody>
@@ -2108,7 +2605,7 @@
           <a:p>
             <a:fld id="{4509A250-FF31-4206-8172-F9D3106AACB1}" type="datetimeFigureOut">
               <a:rPr lang="en-US" smtClean="0"/>
-              <a:t>3/18/18</a:t>
+              <a:t>3/19/18</a:t>
             </a:fld>
             <a:endParaRPr lang="en-US" dirty="0"/>
           </a:p>
@@ -2159,7 +2656,7 @@
     </p:spTree>
     <p:extLst>
       <p:ext uri="{BB962C8B-B14F-4D97-AF65-F5344CB8AC3E}">
-        <p14:creationId xmlns:p14="http://schemas.microsoft.com/office/powerpoint/2010/main" val="1830636100"/>
+        <p14:creationId xmlns:p14="http://schemas.microsoft.com/office/powerpoint/2010/main" val="2917660893"/>
       </p:ext>
     </p:extLst>
   </p:cSld>
@@ -2198,8 +2695,8 @@
         </p:nvSpPr>
         <p:spPr>
           <a:xfrm>
-            <a:off x="629841" y="457200"/>
-            <a:ext cx="2949178" cy="1600200"/>
+            <a:off x="839788" y="457200"/>
+            <a:ext cx="3932237" cy="1600200"/>
           </a:xfrm>
         </p:spPr>
         <p:txBody>
@@ -2230,8 +2727,8 @@
         </p:nvSpPr>
         <p:spPr>
           <a:xfrm>
-            <a:off x="3887391" y="987428"/>
-            <a:ext cx="4629150" cy="4873625"/>
+            <a:off x="5183188" y="987425"/>
+            <a:ext cx="6172200" cy="4873625"/>
           </a:xfrm>
         </p:spPr>
         <p:txBody>
@@ -2295,8 +2792,8 @@
         </p:nvSpPr>
         <p:spPr>
           <a:xfrm>
-            <a:off x="629841" y="2057400"/>
-            <a:ext cx="2949178" cy="3811588"/>
+            <a:off x="839788" y="2057400"/>
+            <a:ext cx="3932237" cy="3811588"/>
           </a:xfrm>
         </p:spPr>
         <p:txBody>
@@ -2365,7 +2862,7 @@
           <a:p>
             <a:fld id="{4509A250-FF31-4206-8172-F9D3106AACB1}" type="datetimeFigureOut">
               <a:rPr lang="en-US" smtClean="0"/>
-              <a:t>3/18/18</a:t>
+              <a:t>3/19/18</a:t>
             </a:fld>
             <a:endParaRPr lang="en-US" dirty="0"/>
           </a:p>
@@ -2416,7 +2913,7 @@
     </p:spTree>
     <p:extLst>
       <p:ext uri="{BB962C8B-B14F-4D97-AF65-F5344CB8AC3E}">
-        <p14:creationId xmlns:p14="http://schemas.microsoft.com/office/powerpoint/2010/main" val="2309123029"/>
+        <p14:creationId xmlns:p14="http://schemas.microsoft.com/office/powerpoint/2010/main" val="1031119875"/>
       </p:ext>
     </p:extLst>
   </p:cSld>
@@ -2460,8 +2957,8 @@
         </p:nvSpPr>
         <p:spPr>
           <a:xfrm>
-            <a:off x="628650" y="365128"/>
-            <a:ext cx="7886700" cy="1325563"/>
+            <a:off x="838200" y="365125"/>
+            <a:ext cx="10515600" cy="1325563"/>
           </a:xfrm>
           <a:prstGeom prst="rect">
             <a:avLst/>
@@ -2493,8 +2990,8 @@
         </p:nvSpPr>
         <p:spPr>
           <a:xfrm>
-            <a:off x="628650" y="1825625"/>
-            <a:ext cx="7886700" cy="4351338"/>
+            <a:off x="838200" y="1825625"/>
+            <a:ext cx="10515600" cy="4351338"/>
           </a:xfrm>
           <a:prstGeom prst="rect">
             <a:avLst/>
@@ -2555,8 +3052,8 @@
         </p:nvSpPr>
         <p:spPr>
           <a:xfrm>
-            <a:off x="628650" y="6356353"/>
-            <a:ext cx="2057400" cy="365125"/>
+            <a:off x="838200" y="6356350"/>
+            <a:ext cx="2743200" cy="365125"/>
           </a:xfrm>
           <a:prstGeom prst="rect">
             <a:avLst/>
@@ -2578,7 +3075,7 @@
           <a:p>
             <a:fld id="{4AAD347D-5ACD-4C99-B74B-A9C85AD731AF}" type="datetimeFigureOut">
               <a:rPr lang="en-US" smtClean="0"/>
-              <a:t>3/18/18</a:t>
+              <a:t>3/19/18</a:t>
             </a:fld>
             <a:endParaRPr lang="en-US" dirty="0"/>
           </a:p>
@@ -2596,8 +3093,8 @@
         </p:nvSpPr>
         <p:spPr>
           <a:xfrm>
-            <a:off x="3028950" y="6356353"/>
-            <a:ext cx="3086100" cy="365125"/>
+            <a:off x="4038600" y="6356350"/>
+            <a:ext cx="4114800" cy="365125"/>
           </a:xfrm>
           <a:prstGeom prst="rect">
             <a:avLst/>
@@ -2633,8 +3130,8 @@
         </p:nvSpPr>
         <p:spPr>
           <a:xfrm>
-            <a:off x="6457950" y="6356353"/>
-            <a:ext cx="2057400" cy="365125"/>
+            <a:off x="8610600" y="6356350"/>
+            <a:ext cx="2743200" cy="365125"/>
           </a:xfrm>
           <a:prstGeom prst="rect">
             <a:avLst/>
@@ -2667,7 +3164,7 @@
           <p:cNvPr id="7" name="Picture 6">
             <a:extLst>
               <a:ext uri="{FF2B5EF4-FFF2-40B4-BE49-F238E27FC236}">
-                <a16:creationId xmlns:a16="http://schemas.microsoft.com/office/drawing/2014/main" id="{8394413D-6D75-134C-B23B-E5323B5D03FD}"/>
+                <a16:creationId xmlns:a16="http://schemas.microsoft.com/office/drawing/2014/main" id="{9C79563A-A118-9D4B-812C-2B5612EC2122}"/>
               </a:ext>
             </a:extLst>
           </p:cNvPr>
@@ -2684,7 +3181,7 @@
         </p:blipFill>
         <p:spPr>
           <a:xfrm>
-            <a:off x="7597588" y="6215236"/>
+            <a:off x="10634709" y="6215235"/>
             <a:ext cx="1438181" cy="506240"/>
           </a:xfrm>
           <a:prstGeom prst="rect">
@@ -2695,23 +3192,23 @@
     </p:spTree>
     <p:extLst>
       <p:ext uri="{BB962C8B-B14F-4D97-AF65-F5344CB8AC3E}">
-        <p14:creationId xmlns:p14="http://schemas.microsoft.com/office/powerpoint/2010/main" val="2403026603"/>
+        <p14:creationId xmlns:p14="http://schemas.microsoft.com/office/powerpoint/2010/main" val="3626563577"/>
       </p:ext>
     </p:extLst>
   </p:cSld>
   <p:clrMap bg1="lt1" tx1="dk1" bg2="lt2" tx2="dk2" accent1="accent1" accent2="accent2" accent3="accent3" accent4="accent4" accent5="accent5" accent6="accent6" hlink="hlink" folHlink="folHlink"/>
   <p:sldLayoutIdLst>
-    <p:sldLayoutId id="2147483720" r:id="rId1"/>
-    <p:sldLayoutId id="2147483721" r:id="rId2"/>
-    <p:sldLayoutId id="2147483722" r:id="rId3"/>
-    <p:sldLayoutId id="2147483723" r:id="rId4"/>
-    <p:sldLayoutId id="2147483724" r:id="rId5"/>
-    <p:sldLayoutId id="2147483725" r:id="rId6"/>
-    <p:sldLayoutId id="2147483726" r:id="rId7"/>
-    <p:sldLayoutId id="2147483727" r:id="rId8"/>
-    <p:sldLayoutId id="2147483728" r:id="rId9"/>
-    <p:sldLayoutId id="2147483729" r:id="rId10"/>
-    <p:sldLayoutId id="2147483730" r:id="rId11"/>
+    <p:sldLayoutId id="2147483732" r:id="rId1"/>
+    <p:sldLayoutId id="2147483733" r:id="rId2"/>
+    <p:sldLayoutId id="2147483734" r:id="rId3"/>
+    <p:sldLayoutId id="2147483735" r:id="rId4"/>
+    <p:sldLayoutId id="2147483736" r:id="rId5"/>
+    <p:sldLayoutId id="2147483737" r:id="rId6"/>
+    <p:sldLayoutId id="2147483738" r:id="rId7"/>
+    <p:sldLayoutId id="2147483739" r:id="rId8"/>
+    <p:sldLayoutId id="2147483740" r:id="rId9"/>
+    <p:sldLayoutId id="2147483741" r:id="rId10"/>
+    <p:sldLayoutId id="2147483742" r:id="rId11"/>
   </p:sldLayoutIdLst>
   <p:hf sldNum="0" hdr="0" ftr="0" dt="0"/>
   <p:txStyles>
@@ -3285,8 +3782,8 @@
           </p:nvPr>
         </p:nvGraphicFramePr>
         <p:xfrm>
-          <a:off x="622300" y="1816100"/>
-          <a:ext cx="7886700" cy="4343400"/>
+          <a:off x="838200" y="1816100"/>
+          <a:ext cx="10515600" cy="4343400"/>
         </p:xfrm>
         <a:graphic>
           <a:graphicData uri="http://schemas.openxmlformats.org/drawingml/2006/table">
@@ -3295,10 +3792,10 @@
                 <a:tableStyleId>{5C22544A-7EE6-4342-B048-85BDC9FD1C3A}</a:tableStyleId>
               </a:tblPr>
               <a:tblGrid>
-                <a:gridCol w="1968500"/>
-                <a:gridCol w="1968500"/>
-                <a:gridCol w="1968500"/>
-                <a:gridCol w="1968500"/>
+                <a:gridCol w="2628900"/>
+                <a:gridCol w="2628900"/>
+                <a:gridCol w="2628900"/>
+                <a:gridCol w="2628900"/>
               </a:tblGrid>
               <a:tr h="0">
                 <a:tc>
@@ -3622,8 +4119,8 @@
           </p:nvPr>
         </p:nvGraphicFramePr>
         <p:xfrm>
-          <a:off x="622300" y="1816100"/>
-          <a:ext cx="7886700" cy="4343400"/>
+          <a:off x="838200" y="1816100"/>
+          <a:ext cx="10515600" cy="4343400"/>
         </p:xfrm>
         <a:graphic>
           <a:graphicData uri="http://schemas.openxmlformats.org/drawingml/2006/table">
@@ -3632,17 +4129,17 @@
                 <a:tableStyleId>{5C22544A-7EE6-4342-B048-85BDC9FD1C3A}</a:tableStyleId>
               </a:tblPr>
               <a:tblGrid>
-                <a:gridCol w="711200"/>
-                <a:gridCol w="711200"/>
-                <a:gridCol w="711200"/>
-                <a:gridCol w="711200"/>
-                <a:gridCol w="711200"/>
-                <a:gridCol w="711200"/>
-                <a:gridCol w="711200"/>
-                <a:gridCol w="711200"/>
-                <a:gridCol w="711200"/>
-                <a:gridCol w="711200"/>
-                <a:gridCol w="711200"/>
+                <a:gridCol w="952500"/>
+                <a:gridCol w="952500"/>
+                <a:gridCol w="952500"/>
+                <a:gridCol w="952500"/>
+                <a:gridCol w="952500"/>
+                <a:gridCol w="952500"/>
+                <a:gridCol w="952500"/>
+                <a:gridCol w="952500"/>
+                <a:gridCol w="952500"/>
+                <a:gridCol w="952500"/>
+                <a:gridCol w="952500"/>
               </a:tblGrid>
               <a:tr h="0">
                 <a:tc>
@@ -4611,7 +5108,7 @@
         </p:blipFill>
         <p:spPr bwMode="auto">
           <a:xfrm>
-            <a:off x="3086100" y="1816100"/>
+            <a:off x="4622800" y="1816100"/>
             <a:ext cx="2946400" cy="3835400"/>
           </a:xfrm>
           <a:prstGeom prst="rect">
@@ -4633,8 +5130,8 @@
         </p:nvSpPr>
         <p:spPr>
           <a:xfrm>
-            <a:off x="622300" y="5651500"/>
-            <a:ext cx="7886700" cy="508000"/>
+            <a:off x="838200" y="5651500"/>
+            <a:ext cx="10515600" cy="508000"/>
           </a:xfrm>
           <a:prstGeom prst="rect">
             <a:avLst/>
@@ -5304,7 +5801,7 @@
         </p:blipFill>
         <p:spPr bwMode="auto">
           <a:xfrm>
-            <a:off x="736600" y="1816100"/>
+            <a:off x="2260600" y="1816100"/>
             <a:ext cx="7670800" cy="3835400"/>
           </a:xfrm>
           <a:prstGeom prst="rect">
@@ -5326,8 +5823,8 @@
         </p:nvSpPr>
         <p:spPr>
           <a:xfrm>
-            <a:off x="622300" y="5651500"/>
-            <a:ext cx="7886700" cy="508000"/>
+            <a:off x="838200" y="5651500"/>
+            <a:ext cx="10515600" cy="508000"/>
           </a:xfrm>
           <a:prstGeom prst="rect">
             <a:avLst/>
@@ -5467,7 +5964,7 @@
         </p:blipFill>
         <p:spPr bwMode="auto">
           <a:xfrm>
-            <a:off x="1143000" y="1816100"/>
+            <a:off x="2679700" y="1816100"/>
             <a:ext cx="6832600" cy="3835400"/>
           </a:xfrm>
           <a:prstGeom prst="rect">
@@ -5489,8 +5986,8 @@
         </p:nvSpPr>
         <p:spPr>
           <a:xfrm>
-            <a:off x="622300" y="5651500"/>
-            <a:ext cx="7886700" cy="508000"/>
+            <a:off x="838200" y="5651500"/>
+            <a:ext cx="10515600" cy="508000"/>
           </a:xfrm>
           <a:prstGeom prst="rect">
             <a:avLst/>
@@ -5595,7 +6092,7 @@
 <file path=ppt/theme/theme1.xml><?xml version="1.0" encoding="utf-8"?>
 <a:theme xmlns:a="http://schemas.openxmlformats.org/drawingml/2006/main" name="Office Theme">
   <a:themeElements>
-    <a:clrScheme name="Office">
+    <a:clrScheme name="Office Theme">
       <a:dk1>
         <a:sysClr val="windowText" lastClr="000000"/>
       </a:dk1>
@@ -5609,22 +6106,22 @@
         <a:srgbClr val="E7E6E6"/>
       </a:lt2>
       <a:accent1>
-        <a:srgbClr val="4472C4"/>
+        <a:srgbClr val="29AF8C"/>
       </a:accent1>
       <a:accent2>
-        <a:srgbClr val="ED7D31"/>
+        <a:srgbClr val="97BE49"/>
       </a:accent2>
       <a:accent3>
-        <a:srgbClr val="A5A5A5"/>
+        <a:srgbClr val="3D9CCC"/>
       </a:accent3>
       <a:accent4>
-        <a:srgbClr val="FFC000"/>
+        <a:srgbClr val="7C60C6"/>
       </a:accent4>
       <a:accent5>
-        <a:srgbClr val="5B9BD5"/>
+        <a:srgbClr val="C9492C"/>
       </a:accent5>
       <a:accent6>
-        <a:srgbClr val="70AD47"/>
+        <a:srgbClr val="D58C2E"/>
       </a:accent6>
       <a:hlink>
         <a:srgbClr val="0563C1"/>
@@ -5633,7 +6130,7 @@
         <a:srgbClr val="954F72"/>
       </a:folHlink>
     </a:clrScheme>
-    <a:fontScheme name="Office">
+    <a:fontScheme name="Office Theme">
       <a:majorFont>
         <a:latin typeface="Calibri Light" panose="020F0302020204030204"/>
         <a:ea typeface=""/>
@@ -5668,23 +6165,6 @@
         <a:font script="Viet" typeface="Times New Roman"/>
         <a:font script="Uigh" typeface="Microsoft Uighur"/>
         <a:font script="Geor" typeface="Sylfaen"/>
-        <a:font script="Armn" typeface="Arial"/>
-        <a:font script="Bugi" typeface="Leelawadee UI"/>
-        <a:font script="Bopo" typeface="Microsoft JhengHei"/>
-        <a:font script="Java" typeface="Javanese Text"/>
-        <a:font script="Lisu" typeface="Segoe UI"/>
-        <a:font script="Mymr" typeface="Myanmar Text"/>
-        <a:font script="Nkoo" typeface="Ebrima"/>
-        <a:font script="Olck" typeface="Nirmala UI"/>
-        <a:font script="Osma" typeface="Ebrima"/>
-        <a:font script="Phag" typeface="Phagspa"/>
-        <a:font script="Syrn" typeface="Estrangelo Edessa"/>
-        <a:font script="Syrj" typeface="Estrangelo Edessa"/>
-        <a:font script="Syre" typeface="Estrangelo Edessa"/>
-        <a:font script="Sora" typeface="Nirmala UI"/>
-        <a:font script="Tale" typeface="Microsoft Tai Le"/>
-        <a:font script="Talu" typeface="Microsoft New Tai Lue"/>
-        <a:font script="Tfng" typeface="Ebrima"/>
       </a:majorFont>
       <a:minorFont>
         <a:latin typeface="Calibri" panose="020F0502020204030204"/>
@@ -5720,23 +6200,6 @@
         <a:font script="Viet" typeface="Arial"/>
         <a:font script="Uigh" typeface="Microsoft Uighur"/>
         <a:font script="Geor" typeface="Sylfaen"/>
-        <a:font script="Armn" typeface="Arial"/>
-        <a:font script="Bugi" typeface="Leelawadee UI"/>
-        <a:font script="Bopo" typeface="Microsoft JhengHei"/>
-        <a:font script="Java" typeface="Javanese Text"/>
-        <a:font script="Lisu" typeface="Segoe UI"/>
-        <a:font script="Mymr" typeface="Myanmar Text"/>
-        <a:font script="Nkoo" typeface="Ebrima"/>
-        <a:font script="Olck" typeface="Nirmala UI"/>
-        <a:font script="Osma" typeface="Ebrima"/>
-        <a:font script="Phag" typeface="Phagspa"/>
-        <a:font script="Syrn" typeface="Estrangelo Edessa"/>
-        <a:font script="Syrj" typeface="Estrangelo Edessa"/>
-        <a:font script="Syre" typeface="Estrangelo Edessa"/>
-        <a:font script="Sora" typeface="Nirmala UI"/>
-        <a:font script="Tale" typeface="Microsoft Tai Le"/>
-        <a:font script="Talu" typeface="Microsoft New Tai Lue"/>
-        <a:font script="Tfng" typeface="Ebrima"/>
       </a:minorFont>
     </a:fontScheme>
     <a:fmtScheme name="Office Theme">
@@ -5885,4 +6348,265 @@
     </a:ext>
   </a:extLst>
 </a:theme>
+</file>
+
+<file path=ppt/theme/theme2.xml><?xml version="1.0" encoding="utf-8"?>
+<a:theme xmlns:a="http://schemas.openxmlformats.org/drawingml/2006/main" name="Office Theme">
+  <a:themeElements>
+    <a:clrScheme name="Office">
+      <a:dk1>
+        <a:sysClr val="windowText" lastClr="000000"/>
+      </a:dk1>
+      <a:lt1>
+        <a:sysClr val="window" lastClr="FFFFFF"/>
+      </a:lt1>
+      <a:dk2>
+        <a:srgbClr val="44546A"/>
+      </a:dk2>
+      <a:lt2>
+        <a:srgbClr val="E7E6E6"/>
+      </a:lt2>
+      <a:accent1>
+        <a:srgbClr val="5B9BD5"/>
+      </a:accent1>
+      <a:accent2>
+        <a:srgbClr val="ED7D31"/>
+      </a:accent2>
+      <a:accent3>
+        <a:srgbClr val="A5A5A5"/>
+      </a:accent3>
+      <a:accent4>
+        <a:srgbClr val="FFC000"/>
+      </a:accent4>
+      <a:accent5>
+        <a:srgbClr val="4472C4"/>
+      </a:accent5>
+      <a:accent6>
+        <a:srgbClr val="70AD47"/>
+      </a:accent6>
+      <a:hlink>
+        <a:srgbClr val="0563C1"/>
+      </a:hlink>
+      <a:folHlink>
+        <a:srgbClr val="954F72"/>
+      </a:folHlink>
+    </a:clrScheme>
+    <a:fontScheme name="Office">
+      <a:majorFont>
+        <a:latin typeface="Calibri Light" panose="020F0302020204030204"/>
+        <a:ea typeface=""/>
+        <a:cs typeface=""/>
+        <a:font script="Jpan" typeface="ＭＳ Ｐゴシック"/>
+        <a:font script="Hang" typeface="맑은 고딕"/>
+        <a:font script="Hans" typeface="宋体"/>
+        <a:font script="Hant" typeface="新細明體"/>
+        <a:font script="Arab" typeface="Times New Roman"/>
+        <a:font script="Hebr" typeface="Times New Roman"/>
+        <a:font script="Thai" typeface="Angsana New"/>
+        <a:font script="Ethi" typeface="Nyala"/>
+        <a:font script="Beng" typeface="Vrinda"/>
+        <a:font script="Gujr" typeface="Shruti"/>
+        <a:font script="Khmr" typeface="MoolBoran"/>
+        <a:font script="Knda" typeface="Tunga"/>
+        <a:font script="Guru" typeface="Raavi"/>
+        <a:font script="Cans" typeface="Euphemia"/>
+        <a:font script="Cher" typeface="Plantagenet Cherokee"/>
+        <a:font script="Yiii" typeface="Microsoft Yi Baiti"/>
+        <a:font script="Tibt" typeface="Microsoft Himalaya"/>
+        <a:font script="Thaa" typeface="MV Boli"/>
+        <a:font script="Deva" typeface="Mangal"/>
+        <a:font script="Telu" typeface="Gautami"/>
+        <a:font script="Taml" typeface="Latha"/>
+        <a:font script="Syrc" typeface="Estrangelo Edessa"/>
+        <a:font script="Orya" typeface="Kalinga"/>
+        <a:font script="Mlym" typeface="Kartika"/>
+        <a:font script="Laoo" typeface="DokChampa"/>
+        <a:font script="Sinh" typeface="Iskoola Pota"/>
+        <a:font script="Mong" typeface="Mongolian Baiti"/>
+        <a:font script="Viet" typeface="Times New Roman"/>
+        <a:font script="Uigh" typeface="Microsoft Uighur"/>
+        <a:font script="Geor" typeface="Sylfaen"/>
+      </a:majorFont>
+      <a:minorFont>
+        <a:latin typeface="Calibri" panose="020F0502020204030204"/>
+        <a:ea typeface=""/>
+        <a:cs typeface=""/>
+        <a:font script="Jpan" typeface="ＭＳ Ｐゴシック"/>
+        <a:font script="Hang" typeface="맑은 고딕"/>
+        <a:font script="Hans" typeface="宋体"/>
+        <a:font script="Hant" typeface="新細明體"/>
+        <a:font script="Arab" typeface="Arial"/>
+        <a:font script="Hebr" typeface="Arial"/>
+        <a:font script="Thai" typeface="Cordia New"/>
+        <a:font script="Ethi" typeface="Nyala"/>
+        <a:font script="Beng" typeface="Vrinda"/>
+        <a:font script="Gujr" typeface="Shruti"/>
+        <a:font script="Khmr" typeface="DaunPenh"/>
+        <a:font script="Knda" typeface="Tunga"/>
+        <a:font script="Guru" typeface="Raavi"/>
+        <a:font script="Cans" typeface="Euphemia"/>
+        <a:font script="Cher" typeface="Plantagenet Cherokee"/>
+        <a:font script="Yiii" typeface="Microsoft Yi Baiti"/>
+        <a:font script="Tibt" typeface="Microsoft Himalaya"/>
+        <a:font script="Thaa" typeface="MV Boli"/>
+        <a:font script="Deva" typeface="Mangal"/>
+        <a:font script="Telu" typeface="Gautami"/>
+        <a:font script="Taml" typeface="Latha"/>
+        <a:font script="Syrc" typeface="Estrangelo Edessa"/>
+        <a:font script="Orya" typeface="Kalinga"/>
+        <a:font script="Mlym" typeface="Kartika"/>
+        <a:font script="Laoo" typeface="DokChampa"/>
+        <a:font script="Sinh" typeface="Iskoola Pota"/>
+        <a:font script="Mong" typeface="Mongolian Baiti"/>
+        <a:font script="Viet" typeface="Arial"/>
+        <a:font script="Uigh" typeface="Microsoft Uighur"/>
+        <a:font script="Geor" typeface="Sylfaen"/>
+      </a:minorFont>
+    </a:fontScheme>
+    <a:fmtScheme name="Office">
+      <a:fillStyleLst>
+        <a:solidFill>
+          <a:schemeClr val="phClr"/>
+        </a:solidFill>
+        <a:gradFill rotWithShape="1">
+          <a:gsLst>
+            <a:gs pos="0">
+              <a:schemeClr val="phClr">
+                <a:lumMod val="110000"/>
+                <a:satMod val="105000"/>
+                <a:tint val="67000"/>
+              </a:schemeClr>
+            </a:gs>
+            <a:gs pos="50000">
+              <a:schemeClr val="phClr">
+                <a:lumMod val="105000"/>
+                <a:satMod val="103000"/>
+                <a:tint val="73000"/>
+              </a:schemeClr>
+            </a:gs>
+            <a:gs pos="100000">
+              <a:schemeClr val="phClr">
+                <a:lumMod val="105000"/>
+                <a:satMod val="109000"/>
+                <a:tint val="81000"/>
+              </a:schemeClr>
+            </a:gs>
+          </a:gsLst>
+          <a:lin ang="5400000" scaled="0"/>
+        </a:gradFill>
+        <a:gradFill rotWithShape="1">
+          <a:gsLst>
+            <a:gs pos="0">
+              <a:schemeClr val="phClr">
+                <a:satMod val="103000"/>
+                <a:lumMod val="102000"/>
+                <a:tint val="94000"/>
+              </a:schemeClr>
+            </a:gs>
+            <a:gs pos="50000">
+              <a:schemeClr val="phClr">
+                <a:satMod val="110000"/>
+                <a:lumMod val="100000"/>
+                <a:shade val="100000"/>
+              </a:schemeClr>
+            </a:gs>
+            <a:gs pos="100000">
+              <a:schemeClr val="phClr">
+                <a:lumMod val="99000"/>
+                <a:satMod val="120000"/>
+                <a:shade val="78000"/>
+              </a:schemeClr>
+            </a:gs>
+          </a:gsLst>
+          <a:lin ang="5400000" scaled="0"/>
+        </a:gradFill>
+      </a:fillStyleLst>
+      <a:lnStyleLst>
+        <a:ln w="6350" cap="flat" cmpd="sng" algn="ctr">
+          <a:solidFill>
+            <a:schemeClr val="phClr"/>
+          </a:solidFill>
+          <a:prstDash val="solid"/>
+          <a:miter lim="800000"/>
+        </a:ln>
+        <a:ln w="12700" cap="flat" cmpd="sng" algn="ctr">
+          <a:solidFill>
+            <a:schemeClr val="phClr"/>
+          </a:solidFill>
+          <a:prstDash val="solid"/>
+          <a:miter lim="800000"/>
+        </a:ln>
+        <a:ln w="19050" cap="flat" cmpd="sng" algn="ctr">
+          <a:solidFill>
+            <a:schemeClr val="phClr"/>
+          </a:solidFill>
+          <a:prstDash val="solid"/>
+          <a:miter lim="800000"/>
+        </a:ln>
+      </a:lnStyleLst>
+      <a:effectStyleLst>
+        <a:effectStyle>
+          <a:effectLst/>
+        </a:effectStyle>
+        <a:effectStyle>
+          <a:effectLst/>
+        </a:effectStyle>
+        <a:effectStyle>
+          <a:effectLst>
+            <a:outerShdw blurRad="57150" dist="19050" dir="5400000" algn="ctr" rotWithShape="0">
+              <a:srgbClr val="000000">
+                <a:alpha val="63000"/>
+              </a:srgbClr>
+            </a:outerShdw>
+          </a:effectLst>
+        </a:effectStyle>
+      </a:effectStyleLst>
+      <a:bgFillStyleLst>
+        <a:solidFill>
+          <a:schemeClr val="phClr"/>
+        </a:solidFill>
+        <a:solidFill>
+          <a:schemeClr val="phClr">
+            <a:tint val="95000"/>
+            <a:satMod val="170000"/>
+          </a:schemeClr>
+        </a:solidFill>
+        <a:gradFill rotWithShape="1">
+          <a:gsLst>
+            <a:gs pos="0">
+              <a:schemeClr val="phClr">
+                <a:tint val="93000"/>
+                <a:satMod val="150000"/>
+                <a:shade val="98000"/>
+                <a:lumMod val="102000"/>
+              </a:schemeClr>
+            </a:gs>
+            <a:gs pos="50000">
+              <a:schemeClr val="phClr">
+                <a:tint val="98000"/>
+                <a:satMod val="130000"/>
+                <a:shade val="90000"/>
+                <a:lumMod val="103000"/>
+              </a:schemeClr>
+            </a:gs>
+            <a:gs pos="100000">
+              <a:schemeClr val="phClr">
+                <a:shade val="63000"/>
+                <a:satMod val="120000"/>
+              </a:schemeClr>
+            </a:gs>
+          </a:gsLst>
+          <a:lin ang="5400000" scaled="0"/>
+        </a:gradFill>
+      </a:bgFillStyleLst>
+    </a:fmtScheme>
+  </a:themeElements>
+  <a:objectDefaults/>
+  <a:extraClrSchemeLst/>
+  <a:extLst>
+    <a:ext uri="{05A4C25C-085E-4340-85A3-A5531E510DB2}">
+      <thm15:themeFamily xmlns:thm15="http://schemas.microsoft.com/office/thememl/2012/main" name="Office Theme" id="{62F939B6-93AF-4DB8-9C6B-D6C7DFDC589F}" vid="{4A3C46E8-61CC-4603-A589-7422A47A8E4A}"/>
+    </a:ext>
+  </a:extLst>
+</a:theme>
 </file>
</xml_diff>